<commit_message>
Presentation updated with logo
Just logo changed
</commit_message>
<xml_diff>
--- a/Presentation1.pptx
+++ b/Presentation1.pptx
@@ -200,6 +200,7 @@
           <a:p>
             <a:fld id="{D778E517-D5B5-49F8-801E-E6EEDD1D3D2E}" type="datetimeFigureOut">
               <a:rPr lang="en-US" smtClean="0"/>
+              <a:pPr/>
               <a:t>7/7/2019</a:t>
             </a:fld>
             <a:endParaRPr lang="en-US"/>
@@ -266,6 +267,7 @@
           <a:p>
             <a:fld id="{6F8E6AF5-4A2C-4FE0-8ABB-CDA190C9447E}" type="slidenum">
               <a:rPr lang="en-US" smtClean="0"/>
+              <a:pPr/>
               <a:t>‹#›</a:t>
             </a:fld>
             <a:endParaRPr lang="en-US"/>
@@ -361,6 +363,7 @@
           <a:p>
             <a:fld id="{8BF2B869-F00B-4837-B3D5-16B171A07321}" type="datetimeFigureOut">
               <a:rPr lang="en-US" smtClean="0"/>
+              <a:pPr/>
               <a:t>7/7/2019</a:t>
             </a:fld>
             <a:endParaRPr lang="en-US"/>
@@ -522,6 +525,7 @@
           <a:p>
             <a:fld id="{E38D8828-0529-41B8-9DF4-6F341CE8CBCE}" type="slidenum">
               <a:rPr lang="en-US" smtClean="0"/>
+              <a:pPr/>
               <a:t>‹#›</a:t>
             </a:fld>
             <a:endParaRPr lang="en-US"/>
@@ -694,6 +698,7 @@
           <a:p>
             <a:fld id="{E38D8828-0529-41B8-9DF4-6F341CE8CBCE}" type="slidenum">
               <a:rPr lang="en-US" smtClean="0"/>
+              <a:pPr/>
               <a:t>1</a:t>
             </a:fld>
             <a:endParaRPr lang="en-US"/>
@@ -889,6 +894,7 @@
           <a:p>
             <a:fld id="{7A3AE60E-A758-4BDA-9BFD-067FF681B4F1}" type="datetime1">
               <a:rPr lang="en-US" smtClean="0"/>
+              <a:pPr/>
               <a:t>7/7/2019</a:t>
             </a:fld>
             <a:endParaRPr lang="en-US"/>
@@ -931,6 +937,7 @@
           <a:p>
             <a:fld id="{68641945-D48B-4313-9B9D-D359CDCBF51E}" type="slidenum">
               <a:rPr lang="en-US" smtClean="0"/>
+              <a:pPr/>
               <a:t>‹#›</a:t>
             </a:fld>
             <a:endParaRPr lang="en-US"/>
@@ -1054,6 +1061,7 @@
           <a:p>
             <a:fld id="{D04F7D1D-D173-4255-8A15-2F67CB5F4DB9}" type="datetime1">
               <a:rPr lang="en-US" smtClean="0"/>
+              <a:pPr/>
               <a:t>7/7/2019</a:t>
             </a:fld>
             <a:endParaRPr lang="en-US"/>
@@ -1096,6 +1104,7 @@
           <a:p>
             <a:fld id="{68641945-D48B-4313-9B9D-D359CDCBF51E}" type="slidenum">
               <a:rPr lang="en-US" smtClean="0"/>
+              <a:pPr/>
               <a:t>‹#›</a:t>
             </a:fld>
             <a:endParaRPr lang="en-US"/>
@@ -1229,6 +1238,7 @@
           <a:p>
             <a:fld id="{C6591139-3DAC-4501-839A-249CB6DC0994}" type="datetime1">
               <a:rPr lang="en-US" smtClean="0"/>
+              <a:pPr/>
               <a:t>7/7/2019</a:t>
             </a:fld>
             <a:endParaRPr lang="en-US"/>
@@ -1271,6 +1281,7 @@
           <a:p>
             <a:fld id="{68641945-D48B-4313-9B9D-D359CDCBF51E}" type="slidenum">
               <a:rPr lang="en-US" smtClean="0"/>
+              <a:pPr/>
               <a:t>‹#›</a:t>
             </a:fld>
             <a:endParaRPr lang="en-US"/>
@@ -1394,6 +1405,7 @@
           <a:p>
             <a:fld id="{CA3075CD-5C7B-4B60-9F18-F7D19E2E741D}" type="datetime1">
               <a:rPr lang="en-US" smtClean="0"/>
+              <a:pPr/>
               <a:t>7/7/2019</a:t>
             </a:fld>
             <a:endParaRPr lang="en-US"/>
@@ -1436,6 +1448,7 @@
           <a:p>
             <a:fld id="{68641945-D48B-4313-9B9D-D359CDCBF51E}" type="slidenum">
               <a:rPr lang="en-US" smtClean="0"/>
+              <a:pPr/>
               <a:t>‹#›</a:t>
             </a:fld>
             <a:endParaRPr lang="en-US"/>
@@ -1635,6 +1648,7 @@
           <a:p>
             <a:fld id="{47108BF0-15CE-4B77-9460-BA0CDDA4DF79}" type="datetime1">
               <a:rPr lang="en-US" smtClean="0"/>
+              <a:pPr/>
               <a:t>7/7/2019</a:t>
             </a:fld>
             <a:endParaRPr lang="en-US"/>
@@ -1677,6 +1691,7 @@
           <a:p>
             <a:fld id="{68641945-D48B-4313-9B9D-D359CDCBF51E}" type="slidenum">
               <a:rPr lang="en-US" smtClean="0"/>
+              <a:pPr/>
               <a:t>‹#›</a:t>
             </a:fld>
             <a:endParaRPr lang="en-US"/>
@@ -1918,6 +1933,7 @@
           <a:p>
             <a:fld id="{C211A904-A235-4B0B-B893-859645874FD6}" type="datetime1">
               <a:rPr lang="en-US" smtClean="0"/>
+              <a:pPr/>
               <a:t>7/7/2019</a:t>
             </a:fld>
             <a:endParaRPr lang="en-US"/>
@@ -1960,6 +1976,7 @@
           <a:p>
             <a:fld id="{68641945-D48B-4313-9B9D-D359CDCBF51E}" type="slidenum">
               <a:rPr lang="en-US" smtClean="0"/>
+              <a:pPr/>
               <a:t>‹#›</a:t>
             </a:fld>
             <a:endParaRPr lang="en-US"/>
@@ -2335,6 +2352,7 @@
           <a:p>
             <a:fld id="{8841DF09-E4F4-48FF-8E47-559F498EF71E}" type="datetime1">
               <a:rPr lang="en-US" smtClean="0"/>
+              <a:pPr/>
               <a:t>7/7/2019</a:t>
             </a:fld>
             <a:endParaRPr lang="en-US"/>
@@ -2377,6 +2395,7 @@
           <a:p>
             <a:fld id="{68641945-D48B-4313-9B9D-D359CDCBF51E}" type="slidenum">
               <a:rPr lang="en-US" smtClean="0"/>
+              <a:pPr/>
               <a:t>‹#›</a:t>
             </a:fld>
             <a:endParaRPr lang="en-US"/>
@@ -2448,6 +2467,7 @@
           <a:p>
             <a:fld id="{E80B8934-8D8A-4182-B2D5-49AE9EE1DB59}" type="datetime1">
               <a:rPr lang="en-US" smtClean="0"/>
+              <a:pPr/>
               <a:t>7/7/2019</a:t>
             </a:fld>
             <a:endParaRPr lang="en-US"/>
@@ -2490,6 +2510,7 @@
           <a:p>
             <a:fld id="{68641945-D48B-4313-9B9D-D359CDCBF51E}" type="slidenum">
               <a:rPr lang="en-US" smtClean="0"/>
+              <a:pPr/>
               <a:t>‹#›</a:t>
             </a:fld>
             <a:endParaRPr lang="en-US"/>
@@ -2538,6 +2559,7 @@
           <a:p>
             <a:fld id="{6E2713EF-A47E-44F4-8EA8-F10A59113F26}" type="datetime1">
               <a:rPr lang="en-US" smtClean="0"/>
+              <a:pPr/>
               <a:t>7/7/2019</a:t>
             </a:fld>
             <a:endParaRPr lang="en-US"/>
@@ -2580,6 +2602,7 @@
           <a:p>
             <a:fld id="{68641945-D48B-4313-9B9D-D359CDCBF51E}" type="slidenum">
               <a:rPr lang="en-US" smtClean="0"/>
+              <a:pPr/>
               <a:t>‹#›</a:t>
             </a:fld>
             <a:endParaRPr lang="en-US"/>
@@ -2810,6 +2833,7 @@
           <a:p>
             <a:fld id="{41608AEA-F60B-4943-A95D-03FF4C10459E}" type="datetime1">
               <a:rPr lang="en-US" smtClean="0"/>
+              <a:pPr/>
               <a:t>7/7/2019</a:t>
             </a:fld>
             <a:endParaRPr lang="en-US"/>
@@ -2852,6 +2876,7 @@
           <a:p>
             <a:fld id="{68641945-D48B-4313-9B9D-D359CDCBF51E}" type="slidenum">
               <a:rPr lang="en-US" smtClean="0"/>
+              <a:pPr/>
               <a:t>‹#›</a:t>
             </a:fld>
             <a:endParaRPr lang="en-US"/>
@@ -3058,6 +3083,7 @@
           <a:p>
             <a:fld id="{15A992E6-CB9C-464B-87F4-11E07193AB7E}" type="datetime1">
               <a:rPr lang="en-US" smtClean="0"/>
+              <a:pPr/>
               <a:t>7/7/2019</a:t>
             </a:fld>
             <a:endParaRPr lang="en-US"/>
@@ -3100,6 +3126,7 @@
           <a:p>
             <a:fld id="{68641945-D48B-4313-9B9D-D359CDCBF51E}" type="slidenum">
               <a:rPr lang="en-US" smtClean="0"/>
+              <a:pPr/>
               <a:t>‹#›</a:t>
             </a:fld>
             <a:endParaRPr lang="en-US"/>
@@ -3266,6 +3293,7 @@
           <a:p>
             <a:fld id="{C03EE3B1-A9C5-474D-8DDB-F6D19D9E64FF}" type="datetime1">
               <a:rPr lang="en-US" smtClean="0"/>
+              <a:pPr/>
               <a:t>7/7/2019</a:t>
             </a:fld>
             <a:endParaRPr lang="en-US"/>
@@ -3344,6 +3372,7 @@
           <a:p>
             <a:fld id="{68641945-D48B-4313-9B9D-D359CDCBF51E}" type="slidenum">
               <a:rPr lang="en-US" smtClean="0"/>
+              <a:pPr/>
               <a:t>‹#›</a:t>
             </a:fld>
             <a:endParaRPr lang="en-US"/>
@@ -3876,40 +3905,117 @@
           </a:p>
         </p:txBody>
       </p:sp>
+      <p:sp>
+        <p:nvSpPr>
+          <p:cNvPr id="6" name="TextBox 5"/>
+          <p:cNvSpPr txBox="1"/>
+          <p:nvPr/>
+        </p:nvSpPr>
+        <p:spPr>
+          <a:xfrm>
+            <a:off x="1219200" y="5943600"/>
+            <a:ext cx="2851422" cy="369332"/>
+          </a:xfrm>
+          <a:prstGeom prst="rect">
+            <a:avLst/>
+          </a:prstGeom>
+          <a:noFill/>
+        </p:spPr>
+        <p:txBody>
+          <a:bodyPr wrap="none" rtlCol="0">
+            <a:spAutoFit/>
+          </a:bodyPr>
+          <a:lstStyle/>
+          <a:p>
+            <a:r>
+              <a:rPr lang="en-US" dirty="0" smtClean="0"/>
+              <a:t>Introduced by Mr.~unknown</a:t>
+            </a:r>
+            <a:endParaRPr lang="en-US" dirty="0"/>
+          </a:p>
+        </p:txBody>
+      </p:sp>
+      <p:sp>
+        <p:nvSpPr>
+          <p:cNvPr id="7" name="Slide Number Placeholder 6"/>
+          <p:cNvSpPr>
+            <a:spLocks noGrp="1"/>
+          </p:cNvSpPr>
+          <p:nvPr>
+            <p:ph type="sldNum" sz="quarter" idx="12"/>
+          </p:nvPr>
+        </p:nvSpPr>
+        <p:spPr/>
+        <p:txBody>
+          <a:bodyPr/>
+          <a:lstStyle/>
+          <a:p>
+            <a:fld id="{68641945-D48B-4313-9B9D-D359CDCBF51E}" type="slidenum">
+              <a:rPr lang="en-US" smtClean="0"/>
+              <a:pPr/>
+              <a:t>1</a:t>
+            </a:fld>
+            <a:endParaRPr lang="en-US"/>
+          </a:p>
+        </p:txBody>
+      </p:sp>
+      <p:sp>
+        <p:nvSpPr>
+          <p:cNvPr id="8" name="TextBox 7"/>
+          <p:cNvSpPr txBox="1"/>
+          <p:nvPr/>
+        </p:nvSpPr>
+        <p:spPr>
+          <a:xfrm>
+            <a:off x="5715000" y="5943600"/>
+            <a:ext cx="2718436" cy="369332"/>
+          </a:xfrm>
+          <a:prstGeom prst="rect">
+            <a:avLst/>
+          </a:prstGeom>
+          <a:noFill/>
+        </p:spPr>
+        <p:txBody>
+          <a:bodyPr wrap="none" rtlCol="0">
+            <a:spAutoFit/>
+          </a:bodyPr>
+          <a:lstStyle/>
+          <a:p>
+            <a:r>
+              <a:rPr lang="en-US" dirty="0" smtClean="0"/>
+              <a:t>Guided By Prof.C.N.Kaneria</a:t>
+            </a:r>
+            <a:endParaRPr lang="en-US" dirty="0"/>
+          </a:p>
+        </p:txBody>
+      </p:sp>
       <p:pic>
         <p:nvPicPr>
-          <p:cNvPr id="4" name="Picture 3" descr="gtu_logo.jpg"/>
+          <p:cNvPr id="9" name="Picture 8" descr="gtu.png"/>
           <p:cNvPicPr>
             <a:picLocks noChangeAspect="1"/>
           </p:cNvPicPr>
           <p:nvPr/>
         </p:nvPicPr>
         <p:blipFill>
-          <a:blip r:embed="rId4">
-            <a:lum bright="30000" contrast="35000"/>
-          </a:blip>
+          <a:blip r:embed="rId4"/>
           <a:stretch>
             <a:fillRect/>
           </a:stretch>
         </p:blipFill>
         <p:spPr>
           <a:xfrm>
-            <a:off x="0" y="0"/>
-            <a:ext cx="1524000" cy="1831596"/>
+            <a:off x="0" y="1"/>
+            <a:ext cx="1600200" cy="1143000"/>
           </a:xfrm>
           <a:prstGeom prst="rect">
             <a:avLst/>
           </a:prstGeom>
-          <a:effectLst>
-            <a:outerShdw blurRad="558800" dir="9000000" sx="96000" sy="96000" algn="ctr" rotWithShape="0">
-              <a:srgbClr val="000000"/>
-            </a:outerShdw>
-          </a:effectLst>
         </p:spPr>
       </p:pic>
       <p:pic>
         <p:nvPicPr>
-          <p:cNvPr id="5" name="Picture 4" descr="dstc_logo.jpg"/>
+          <p:cNvPr id="10" name="Picture 9" descr="image.png"/>
           <p:cNvPicPr>
             <a:picLocks noChangeAspect="1"/>
           </p:cNvPicPr>
@@ -3923,104 +4029,14 @@
         </p:blipFill>
         <p:spPr>
           <a:xfrm>
-            <a:off x="7315200" y="0"/>
-            <a:ext cx="1828800" cy="1828800"/>
+            <a:off x="7772400" y="0"/>
+            <a:ext cx="1406307" cy="1140024"/>
           </a:xfrm>
           <a:prstGeom prst="rect">
             <a:avLst/>
           </a:prstGeom>
-          <a:effectLst>
-            <a:outerShdw blurRad="952500" dist="190500" dir="8940000" algn="ctr" rotWithShape="0">
-              <a:srgbClr val="000000">
-                <a:alpha val="43137"/>
-              </a:srgbClr>
-            </a:outerShdw>
-          </a:effectLst>
         </p:spPr>
       </p:pic>
-      <p:sp>
-        <p:nvSpPr>
-          <p:cNvPr id="6" name="TextBox 5"/>
-          <p:cNvSpPr txBox="1"/>
-          <p:nvPr/>
-        </p:nvSpPr>
-        <p:spPr>
-          <a:xfrm>
-            <a:off x="1219200" y="5943600"/>
-            <a:ext cx="2851422" cy="369332"/>
-          </a:xfrm>
-          <a:prstGeom prst="rect">
-            <a:avLst/>
-          </a:prstGeom>
-          <a:noFill/>
-        </p:spPr>
-        <p:txBody>
-          <a:bodyPr wrap="none" rtlCol="0">
-            <a:spAutoFit/>
-          </a:bodyPr>
-          <a:lstStyle/>
-          <a:p>
-            <a:r>
-              <a:rPr lang="en-US" dirty="0" smtClean="0"/>
-              <a:t>Introduced by Mr.~unknown</a:t>
-            </a:r>
-            <a:endParaRPr lang="en-US" dirty="0"/>
-          </a:p>
-        </p:txBody>
-      </p:sp>
-      <p:sp>
-        <p:nvSpPr>
-          <p:cNvPr id="7" name="Slide Number Placeholder 6"/>
-          <p:cNvSpPr>
-            <a:spLocks noGrp="1"/>
-          </p:cNvSpPr>
-          <p:nvPr>
-            <p:ph type="sldNum" sz="quarter" idx="12"/>
-          </p:nvPr>
-        </p:nvSpPr>
-        <p:spPr/>
-        <p:txBody>
-          <a:bodyPr/>
-          <a:lstStyle/>
-          <a:p>
-            <a:fld id="{68641945-D48B-4313-9B9D-D359CDCBF51E}" type="slidenum">
-              <a:rPr lang="en-US" smtClean="0"/>
-              <a:t>1</a:t>
-            </a:fld>
-            <a:endParaRPr lang="en-US"/>
-          </a:p>
-        </p:txBody>
-      </p:sp>
-      <p:sp>
-        <p:nvSpPr>
-          <p:cNvPr id="8" name="TextBox 7"/>
-          <p:cNvSpPr txBox="1"/>
-          <p:nvPr/>
-        </p:nvSpPr>
-        <p:spPr>
-          <a:xfrm>
-            <a:off x="5715000" y="5943600"/>
-            <a:ext cx="2718436" cy="369332"/>
-          </a:xfrm>
-          <a:prstGeom prst="rect">
-            <a:avLst/>
-          </a:prstGeom>
-          <a:noFill/>
-        </p:spPr>
-        <p:txBody>
-          <a:bodyPr wrap="none" rtlCol="0">
-            <a:spAutoFit/>
-          </a:bodyPr>
-          <a:lstStyle/>
-          <a:p>
-            <a:r>
-              <a:rPr lang="en-US" dirty="0" smtClean="0"/>
-              <a:t>Guided By Prof.C.N.Kaneria</a:t>
-            </a:r>
-            <a:endParaRPr lang="en-US" dirty="0"/>
-          </a:p>
-        </p:txBody>
-      </p:sp>
     </p:spTree>
   </p:cSld>
   <p:clrMapOvr>
@@ -4135,6 +4151,7 @@
           <a:p>
             <a:fld id="{68641945-D48B-4313-9B9D-D359CDCBF51E}" type="slidenum">
               <a:rPr lang="en-US" smtClean="0"/>
+              <a:pPr/>
               <a:t>2</a:t>
             </a:fld>
             <a:endParaRPr lang="en-US"/>
@@ -4274,6 +4291,7 @@
           <a:p>
             <a:fld id="{68641945-D48B-4313-9B9D-D359CDCBF51E}" type="slidenum">
               <a:rPr lang="en-US" smtClean="0"/>
+              <a:pPr/>
               <a:t>3</a:t>
             </a:fld>
             <a:endParaRPr lang="en-US"/>
@@ -4370,7 +4388,6 @@
               <a:rPr lang="en-US" sz="2000" dirty="0" smtClean="0"/>
               <a:t>Developers with their needs may change the site.</a:t>
             </a:r>
-            <a:endParaRPr lang="en-US" sz="2000" dirty="0" smtClean="0"/>
           </a:p>
           <a:p>
             <a:pPr lvl="1"/>
@@ -4469,6 +4486,7 @@
           <a:p>
             <a:fld id="{68641945-D48B-4313-9B9D-D359CDCBF51E}" type="slidenum">
               <a:rPr lang="en-US" smtClean="0"/>
+              <a:pPr/>
               <a:t>4</a:t>
             </a:fld>
             <a:endParaRPr lang="en-US"/>
@@ -4630,6 +4648,7 @@
           <a:p>
             <a:fld id="{68641945-D48B-4313-9B9D-D359CDCBF51E}" type="slidenum">
               <a:rPr lang="en-US" smtClean="0"/>
+              <a:pPr/>
               <a:t>5</a:t>
             </a:fld>
             <a:endParaRPr lang="en-US"/>
@@ -4864,6 +4883,7 @@
           <a:p>
             <a:fld id="{68641945-D48B-4313-9B9D-D359CDCBF51E}" type="slidenum">
               <a:rPr lang="en-US" smtClean="0"/>
+              <a:pPr/>
               <a:t>6</a:t>
             </a:fld>
             <a:endParaRPr lang="en-US"/>

</xml_diff>